<commit_message>
Corrects the spelling of the uno-bootcamp slides
</commit_message>
<xml_diff>
--- a/uno-bootcamp/slides/uno-bootcamp.pptx
+++ b/uno-bootcamp/slides/uno-bootcamp.pptx
@@ -442,7 +442,7 @@
           <a:p>
             <a:fld id="{7ABA9149-DB65-A442-A3DA-844F8F65BFCA}" type="datetimeFigureOut">
               <a:rPr lang="fr-FR" smtClean="0"/>
-              <a:t>18/09/2019</a:t>
+              <a:t>23/10/2019</a:t>
             </a:fld>
             <a:endParaRPr lang="fr-FR"/>
           </a:p>
@@ -508,7 +508,7 @@
           <a:p>
             <a:fld id="{C125792B-F665-B449-B7BD-5F8D99B0A9D4}" type="slidenum">
               <a:rPr lang="fr-FR" smtClean="0"/>
-              <a:t>‹#›</a:t>
+              <a:t>‹Nº›</a:t>
             </a:fld>
             <a:endParaRPr lang="fr-FR"/>
           </a:p>
@@ -640,7 +640,7 @@
             <a:fld id="{D40D7D18-C928-459C-B125-376EAEA05B2A}" type="datetimeFigureOut">
               <a:rPr lang="en-US" altLang="en-US"/>
               <a:pPr/>
-              <a:t>9/18/2019</a:t>
+              <a:t>10/23/2019</a:t>
             </a:fld>
             <a:endParaRPr lang="en-US" altLang="en-US"/>
           </a:p>
@@ -843,7 +843,7 @@
             <a:fld id="{28B05952-4052-49A0-846F-F6F3BC29628C}" type="slidenum">
               <a:rPr lang="en-US" altLang="en-US"/>
               <a:pPr/>
-              <a:t>‹#›</a:t>
+              <a:t>‹Nº›</a:t>
             </a:fld>
             <a:endParaRPr lang="en-US" altLang="en-US"/>
           </a:p>
@@ -17634,7 +17634,7 @@
             <a:fld id="{9FC9EA3E-050C-4C94-A494-5CDEAE7D9D9A}" type="datetimeFigureOut">
               <a:rPr lang="en-US" altLang="en-US"/>
               <a:pPr/>
-              <a:t>9/18/2019</a:t>
+              <a:t>10/23/2019</a:t>
             </a:fld>
             <a:endParaRPr lang="en-US" altLang="en-US"/>
           </a:p>
@@ -17700,7 +17700,7 @@
             <a:fld id="{E6F8F285-E9A9-41E7-9B3A-4E945D1341D3}" type="slidenum">
               <a:rPr lang="en-US" altLang="en-US"/>
               <a:pPr/>
-              <a:t>‹#›</a:t>
+              <a:t>‹Nº›</a:t>
             </a:fld>
             <a:endParaRPr lang="en-US" altLang="en-US"/>
           </a:p>
@@ -18088,7 +18088,7 @@
             <a:fld id="{26021590-AA74-49BC-BAB9-F09457201DF4}" type="datetimeFigureOut">
               <a:rPr lang="en-US" altLang="en-US"/>
               <a:pPr/>
-              <a:t>9/18/2019</a:t>
+              <a:t>10/23/2019</a:t>
             </a:fld>
             <a:endParaRPr lang="en-US" altLang="en-US"/>
           </a:p>
@@ -18154,7 +18154,7 @@
             <a:fld id="{E8E6F247-3AE0-4283-AC15-B11EE1006BBA}" type="slidenum">
               <a:rPr lang="en-US" altLang="en-US"/>
               <a:pPr/>
-              <a:t>‹#›</a:t>
+              <a:t>‹Nº›</a:t>
             </a:fld>
             <a:endParaRPr lang="en-US" altLang="en-US"/>
           </a:p>
@@ -18218,7 +18218,7 @@
             <a:fld id="{2B6006A8-4FAA-4E5A-8E68-E814E3A5E950}" type="datetimeFigureOut">
               <a:rPr lang="en-US" altLang="en-US"/>
               <a:pPr/>
-              <a:t>9/18/2019</a:t>
+              <a:t>10/23/2019</a:t>
             </a:fld>
             <a:endParaRPr lang="en-US" altLang="en-US"/>
           </a:p>
@@ -18284,7 +18284,7 @@
             <a:fld id="{20573B0B-6232-42BF-978C-D75D374580AB}" type="slidenum">
               <a:rPr lang="en-US" altLang="en-US"/>
               <a:pPr/>
-              <a:t>‹#›</a:t>
+              <a:t>‹Nº›</a:t>
             </a:fld>
             <a:endParaRPr lang="en-US" altLang="en-US"/>
           </a:p>
@@ -18411,7 +18411,7 @@
             <a:fld id="{2B6006A8-4FAA-4E5A-8E68-E814E3A5E950}" type="datetimeFigureOut">
               <a:rPr lang="en-US" altLang="en-US"/>
               <a:pPr/>
-              <a:t>9/18/2019</a:t>
+              <a:t>10/23/2019</a:t>
             </a:fld>
             <a:endParaRPr lang="en-US" altLang="en-US"/>
           </a:p>
@@ -18477,7 +18477,7 @@
             <a:fld id="{20573B0B-6232-42BF-978C-D75D374580AB}" type="slidenum">
               <a:rPr lang="en-US" altLang="en-US"/>
               <a:pPr/>
-              <a:t>‹#›</a:t>
+              <a:t>‹Nº›</a:t>
             </a:fld>
             <a:endParaRPr lang="en-US" altLang="en-US"/>
           </a:p>
@@ -18541,7 +18541,7 @@
             <a:fld id="{73D3174C-10E5-4F62-AF5D-A4042F536840}" type="datetimeFigureOut">
               <a:rPr lang="en-US" altLang="en-US"/>
               <a:pPr/>
-              <a:t>9/18/2019</a:t>
+              <a:t>10/23/2019</a:t>
             </a:fld>
             <a:endParaRPr lang="en-US" altLang="en-US"/>
           </a:p>
@@ -18607,7 +18607,7 @@
             <a:fld id="{F37819F9-E71C-406B-9576-ABDFBE75AD29}" type="slidenum">
               <a:rPr lang="en-US" altLang="en-US"/>
               <a:pPr/>
-              <a:t>‹#›</a:t>
+              <a:t>‹Nº›</a:t>
             </a:fld>
             <a:endParaRPr lang="en-US" altLang="en-US"/>
           </a:p>
@@ -18851,7 +18851,7 @@
             <a:fld id="{870D52AE-457E-428C-B4C6-F859DD3E45BC}" type="datetimeFigureOut">
               <a:rPr lang="en-US" altLang="en-US"/>
               <a:pPr/>
-              <a:t>9/18/2019</a:t>
+              <a:t>10/23/2019</a:t>
             </a:fld>
             <a:endParaRPr lang="en-US" altLang="en-US"/>
           </a:p>
@@ -18917,7 +18917,7 @@
             <a:fld id="{4A2F63F3-01F9-4558-94D6-ECAC3B87DF4A}" type="slidenum">
               <a:rPr lang="en-US" altLang="en-US"/>
               <a:pPr/>
-              <a:t>‹#›</a:t>
+              <a:t>‹Nº›</a:t>
             </a:fld>
             <a:endParaRPr lang="en-US" altLang="en-US"/>
           </a:p>
@@ -19141,7 +19141,7 @@
             <a:fld id="{79EC4085-A9E1-4AB8-B5A0-3A47E429EA2B}" type="datetimeFigureOut">
               <a:rPr lang="en-US" altLang="en-US"/>
               <a:pPr/>
-              <a:t>9/18/2019</a:t>
+              <a:t>10/23/2019</a:t>
             </a:fld>
             <a:endParaRPr lang="en-US" altLang="en-US"/>
           </a:p>
@@ -19207,7 +19207,7 @@
             <a:fld id="{043162CD-53BC-4455-A851-E9FFE86A5E93}" type="slidenum">
               <a:rPr lang="en-US" altLang="en-US"/>
               <a:pPr/>
-              <a:t>‹#›</a:t>
+              <a:t>‹Nº›</a:t>
             </a:fld>
             <a:endParaRPr lang="en-US" altLang="en-US"/>
           </a:p>
@@ -19344,7 +19344,7 @@
             <a:fld id="{4F2631ED-2046-4488-94DB-650B6EDBD352}" type="datetimeFigureOut">
               <a:rPr lang="en-US" altLang="en-US"/>
               <a:pPr/>
-              <a:t>9/18/2019</a:t>
+              <a:t>10/23/2019</a:t>
             </a:fld>
             <a:endParaRPr lang="en-US" altLang="en-US"/>
           </a:p>
@@ -19410,7 +19410,7 @@
             <a:fld id="{86599900-46E5-4CA7-A9E0-370B77D5361D}" type="slidenum">
               <a:rPr lang="en-US" altLang="en-US"/>
               <a:pPr/>
-              <a:t>‹#›</a:t>
+              <a:t>‹Nº›</a:t>
             </a:fld>
             <a:endParaRPr lang="en-US" altLang="en-US"/>
           </a:p>
@@ -19557,7 +19557,7 @@
             <a:fld id="{5A195177-B3A4-4FA8-86C5-D7A75900D615}" type="datetimeFigureOut">
               <a:rPr lang="en-US" altLang="en-US"/>
               <a:pPr/>
-              <a:t>9/18/2019</a:t>
+              <a:t>10/23/2019</a:t>
             </a:fld>
             <a:endParaRPr lang="en-US" altLang="en-US"/>
           </a:p>
@@ -19623,7 +19623,7 @@
             <a:fld id="{475DA9F1-4FFE-47E6-9BA9-2FDA24013596}" type="slidenum">
               <a:rPr lang="en-US" altLang="en-US"/>
               <a:pPr/>
-              <a:t>‹#›</a:t>
+              <a:t>‹Nº›</a:t>
             </a:fld>
             <a:endParaRPr lang="en-US" altLang="en-US"/>
           </a:p>
@@ -20276,7 +20276,7 @@
             <a:fld id="{7026131D-A946-4212-9957-5097ABCFD38E}" type="datetimeFigureOut">
               <a:rPr lang="en-US" altLang="en-US"/>
               <a:pPr/>
-              <a:t>9/18/2019</a:t>
+              <a:t>10/23/2019</a:t>
             </a:fld>
             <a:endParaRPr lang="en-US" altLang="en-US"/>
           </a:p>
@@ -20342,7 +20342,7 @@
             <a:fld id="{8E147BBF-7892-47CC-929B-FB0B56DB1723}" type="slidenum">
               <a:rPr lang="en-US" altLang="en-US"/>
               <a:pPr/>
-              <a:t>‹#›</a:t>
+              <a:t>‹Nº›</a:t>
             </a:fld>
             <a:endParaRPr lang="en-US" altLang="en-US"/>
           </a:p>
@@ -20550,7 +20550,7 @@
             <a:fld id="{7026131D-A946-4212-9957-5097ABCFD38E}" type="datetimeFigureOut">
               <a:rPr lang="en-US" altLang="en-US"/>
               <a:pPr/>
-              <a:t>9/18/2019</a:t>
+              <a:t>10/23/2019</a:t>
             </a:fld>
             <a:endParaRPr lang="en-US" altLang="en-US"/>
           </a:p>
@@ -20616,7 +20616,7 @@
             <a:fld id="{8E147BBF-7892-47CC-929B-FB0B56DB1723}" type="slidenum">
               <a:rPr lang="en-US" altLang="en-US"/>
               <a:pPr/>
-              <a:t>‹#›</a:t>
+              <a:t>‹Nº›</a:t>
             </a:fld>
             <a:endParaRPr lang="en-US" altLang="en-US"/>
           </a:p>
@@ -20951,7 +20951,7 @@
             <a:fld id="{7026131D-A946-4212-9957-5097ABCFD38E}" type="datetimeFigureOut">
               <a:rPr lang="en-US" altLang="en-US"/>
               <a:pPr/>
-              <a:t>9/18/2019</a:t>
+              <a:t>10/23/2019</a:t>
             </a:fld>
             <a:endParaRPr lang="en-US" altLang="en-US"/>
           </a:p>
@@ -21017,7 +21017,7 @@
             <a:fld id="{8E147BBF-7892-47CC-929B-FB0B56DB1723}" type="slidenum">
               <a:rPr lang="en-US" altLang="en-US"/>
               <a:pPr/>
-              <a:t>‹#›</a:t>
+              <a:t>‹Nº›</a:t>
             </a:fld>
             <a:endParaRPr lang="en-US" altLang="en-US"/>
           </a:p>
@@ -21347,7 +21347,7 @@
             <a:fld id="{7026131D-A946-4212-9957-5097ABCFD38E}" type="datetimeFigureOut">
               <a:rPr lang="en-US" altLang="en-US"/>
               <a:pPr/>
-              <a:t>9/18/2019</a:t>
+              <a:t>10/23/2019</a:t>
             </a:fld>
             <a:endParaRPr lang="en-US" altLang="en-US"/>
           </a:p>
@@ -21413,7 +21413,7 @@
             <a:fld id="{8E147BBF-7892-47CC-929B-FB0B56DB1723}" type="slidenum">
               <a:rPr lang="en-US" altLang="en-US"/>
               <a:pPr/>
-              <a:t>‹#›</a:t>
+              <a:t>‹Nº›</a:t>
             </a:fld>
             <a:endParaRPr lang="en-US" altLang="en-US"/>
           </a:p>
@@ -21743,7 +21743,7 @@
             <a:fld id="{7026131D-A946-4212-9957-5097ABCFD38E}" type="datetimeFigureOut">
               <a:rPr lang="en-US" altLang="en-US"/>
               <a:pPr/>
-              <a:t>9/18/2019</a:t>
+              <a:t>10/23/2019</a:t>
             </a:fld>
             <a:endParaRPr lang="en-US" altLang="en-US"/>
           </a:p>
@@ -21809,7 +21809,7 @@
             <a:fld id="{8E147BBF-7892-47CC-929B-FB0B56DB1723}" type="slidenum">
               <a:rPr lang="en-US" altLang="en-US"/>
               <a:pPr/>
-              <a:t>‹#›</a:t>
+              <a:t>‹Nº›</a:t>
             </a:fld>
             <a:endParaRPr lang="en-US" altLang="en-US"/>
           </a:p>
@@ -22207,7 +22207,7 @@
             <a:fld id="{7CD73AEF-5BAE-47C9-B239-1CEFA78B07BB}" type="datetimeFigureOut">
               <a:rPr lang="en-US" altLang="en-US"/>
               <a:pPr/>
-              <a:t>9/18/2019</a:t>
+              <a:t>10/23/2019</a:t>
             </a:fld>
             <a:endParaRPr lang="en-US" altLang="en-US"/>
           </a:p>
@@ -22273,7 +22273,7 @@
             <a:fld id="{C3A3BFAD-3706-43E5-A215-BD428BB53948}" type="slidenum">
               <a:rPr lang="en-US" altLang="en-US"/>
               <a:pPr/>
-              <a:t>‹#›</a:t>
+              <a:t>‹Nº›</a:t>
             </a:fld>
             <a:endParaRPr lang="en-US" altLang="en-US"/>
           </a:p>
@@ -22496,7 +22496,7 @@
             <a:fld id="{7026131D-A946-4212-9957-5097ABCFD38E}" type="datetimeFigureOut">
               <a:rPr lang="en-US" altLang="en-US"/>
               <a:pPr/>
-              <a:t>9/18/2019</a:t>
+              <a:t>10/23/2019</a:t>
             </a:fld>
             <a:endParaRPr lang="en-US" altLang="en-US"/>
           </a:p>
@@ -22844,7 +22844,7 @@
             <a:fld id="{4A46A3AB-A418-4741-BD61-648071C08803}" type="datetimeFigureOut">
               <a:rPr lang="en-US" altLang="en-US"/>
               <a:pPr/>
-              <a:t>9/18/2019</a:t>
+              <a:t>10/23/2019</a:t>
             </a:fld>
             <a:endParaRPr lang="en-US" altLang="en-US"/>
           </a:p>
@@ -22910,7 +22910,7 @@
             <a:fld id="{343C00BD-165B-4E72-BEA6-24DE32C6CA17}" type="slidenum">
               <a:rPr lang="en-US" altLang="en-US"/>
               <a:pPr/>
-              <a:t>‹#›</a:t>
+              <a:t>‹Nº›</a:t>
             </a:fld>
             <a:endParaRPr lang="en-US" altLang="en-US"/>
           </a:p>
@@ -23155,7 +23155,7 @@
             <a:fld id="{6FD47689-7374-4675-89C7-82A468159044}" type="datetimeFigureOut">
               <a:rPr lang="en-US" altLang="en-US"/>
               <a:pPr/>
-              <a:t>9/18/2019</a:t>
+              <a:t>10/23/2019</a:t>
             </a:fld>
             <a:endParaRPr lang="en-US" altLang="en-US"/>
           </a:p>
@@ -23261,7 +23261,7 @@
             <a:fld id="{E3AAE7BA-0CD0-4DD7-8531-82FFF142D6EF}" type="slidenum">
               <a:rPr lang="en-US" altLang="en-US"/>
               <a:pPr/>
-              <a:t>‹#›</a:t>
+              <a:t>‹Nº›</a:t>
             </a:fld>
             <a:endParaRPr lang="en-US" altLang="en-US"/>
           </a:p>
@@ -25160,7 +25160,7 @@
             </a:br>
             <a:r>
               <a:rPr lang="en-US" dirty="0"/>
-              <a:t>Since Uno couldn't change the design of the iOS or Android frameworks, Uno made </a:t>
+              <a:t>Since Uno couldn't change the design of the iOS or Android frameworks, Uno made a </a:t>
             </a:r>
             <a:r>
               <a:rPr lang="en-US" dirty="0" err="1"/>
@@ -25168,7 +25168,7 @@
             </a:r>
             <a:r>
               <a:rPr lang="en-US" dirty="0"/>
-              <a:t> a interface with a implementation that is automatically supplied by code generation which makes it incredibly easy to mix UWP view types with purely native views. </a:t>
+              <a:t>, an interface with an implementation that is automatically supplied by code generation which makes it incredibly easy to mix UWP view types with purely native views. </a:t>
             </a:r>
             <a:br>
               <a:rPr lang="en-US" dirty="0"/>
@@ -25194,7 +25194,7 @@
             </a:r>
             <a:r>
               <a:rPr lang="en-US" dirty="0"/>
-              <a:t> on Android, or a </a:t>
+              <a:t> on Android or a </a:t>
             </a:r>
             <a:r>
               <a:rPr lang="en-US" dirty="0" err="1"/>
@@ -26763,13 +26763,13 @@
   <p:clrMapOvr>
     <a:masterClrMapping/>
   </p:clrMapOvr>
-  <mc:AlternateContent xmlns:mc="http://schemas.openxmlformats.org/markup-compatibility/2006">
-    <mc:Choice xmlns:p14="http://schemas.microsoft.com/office/powerpoint/2010/main" Requires="p14">
+  <mc:AlternateContent xmlns:mc="http://schemas.openxmlformats.org/markup-compatibility/2006" xmlns:p14="http://schemas.microsoft.com/office/powerpoint/2010/main">
+    <mc:Choice Requires="p14">
       <p:transition spd="med" p14:dur="700">
         <p:fade/>
       </p:transition>
     </mc:Choice>
-    <mc:Fallback>
+    <mc:Fallback xmlns="">
       <p:transition spd="med">
         <p:fade/>
       </p:transition>
@@ -29651,7 +29651,7 @@
         </p:nvSpPr>
         <p:spPr>
           <a:xfrm>
-            <a:off x="609600" y="1761065"/>
+            <a:off x="609600" y="1362360"/>
             <a:ext cx="10972800" cy="4365097"/>
           </a:xfrm>
         </p:spPr>
@@ -29664,7 +29664,7 @@
             </a:pPr>
             <a:r>
               <a:rPr lang="en-US" dirty="0"/>
-              <a:t>XAML allows us to easily bind our data model to our view. However, the type of data value the view is expecting sometimes doesn't match the type of the data in our model.</a:t>
+              <a:t>XAML allows us to easily bind our data model to our view. However, the type of data value that the view is expecting sometimes doesn't match with the type of the data in our model.</a:t>
             </a:r>
           </a:p>
           <a:p>
@@ -29679,7 +29679,7 @@
             </a:pPr>
             <a:r>
               <a:rPr lang="en-US" dirty="0"/>
-              <a:t>Rather than having to re-work our model, we can create a helper value converter in order to transform the data coming from the model into a type the view can understand by creating a class that implements </a:t>
+              <a:t>Rather than having to re-work our model, we can create a helper value converter in order to transform the data coming from the model into a type that the view can understand by creating a class that implements </a:t>
             </a:r>
             <a:r>
               <a:rPr lang="en-US" i="1" dirty="0" err="1"/>
@@ -31375,13 +31375,13 @@
   <p:clrMapOvr>
     <a:overrideClrMapping bg1="dk1" tx1="lt1" bg2="dk2" tx2="lt2" accent1="accent1" accent2="accent2" accent3="accent3" accent4="accent4" accent5="accent5" accent6="accent6" hlink="hlink" folHlink="folHlink"/>
   </p:clrMapOvr>
-  <mc:AlternateContent xmlns:mc="http://schemas.openxmlformats.org/markup-compatibility/2006">
-    <mc:Choice xmlns:p14="http://schemas.microsoft.com/office/powerpoint/2010/main" Requires="p14">
+  <mc:AlternateContent xmlns:mc="http://schemas.openxmlformats.org/markup-compatibility/2006" xmlns:p14="http://schemas.microsoft.com/office/powerpoint/2010/main">
+    <mc:Choice Requires="p14">
       <p:transition spd="med" p14:dur="700">
         <p:fade/>
       </p:transition>
     </mc:Choice>
-    <mc:Fallback>
+    <mc:Fallback xmlns="">
       <p:transition spd="med">
         <p:fade/>
       </p:transition>
@@ -31534,7 +31534,7 @@
             <a:pPr eaLnBrk="1" hangingPunct="1"/>
             <a:r>
               <a:rPr lang="en-US" dirty="0"/>
-              <a:t>Uno chose to make </a:t>
+              <a:t>Uno choose to make </a:t>
             </a:r>
             <a:r>
               <a:rPr lang="en-US" dirty="0" err="1"/>
@@ -36750,8 +36750,8 @@
         </p:nvSpPr>
         <p:spPr>
           <a:xfrm>
-            <a:off x="609600" y="1761065"/>
-            <a:ext cx="10972800" cy="4365097"/>
+            <a:off x="609600" y="1362360"/>
+            <a:ext cx="10972800" cy="4698729"/>
           </a:xfrm>
         </p:spPr>
         <p:txBody>
@@ -36764,7 +36764,7 @@
                   <a:srgbClr val="242424"/>
                 </a:solidFill>
               </a:rPr>
-              <a:t>Initial developer setup and getting started</a:t>
+              <a:t>Initial developer setup and getting started.</a:t>
             </a:r>
           </a:p>
           <a:p>
@@ -36774,7 +36774,7 @@
                   <a:srgbClr val="242424"/>
                 </a:solidFill>
               </a:rPr>
-              <a:t>The most productive way to develop an application</a:t>
+              <a:t>The most productive way to develop an application.</a:t>
             </a:r>
           </a:p>
           <a:p>
@@ -36784,7 +36784,7 @@
                   <a:srgbClr val="242424"/>
                 </a:solidFill>
               </a:rPr>
-              <a:t>Building a iOS, Android and </a:t>
+              <a:t>Building an iOS, Android and </a:t>
             </a:r>
             <a:r>
               <a:rPr lang="en-US" altLang="en-US" dirty="0" err="1">
@@ -36800,7 +36800,7 @@
                   <a:srgbClr val="242424"/>
                 </a:solidFill>
               </a:rPr>
-              <a:t> apps with Uno</a:t>
+              <a:t> apps with Uno.</a:t>
             </a:r>
           </a:p>
           <a:p>
@@ -36810,7 +36810,7 @@
                   <a:srgbClr val="242424"/>
                 </a:solidFill>
               </a:rPr>
-              <a:t>Building rich, responsive UI on mobile and web</a:t>
+              <a:t>Building rich and responsive UI on mobile and web development.</a:t>
             </a:r>
           </a:p>
           <a:p>
@@ -36820,7 +36820,7 @@
                   <a:srgbClr val="242424"/>
                 </a:solidFill>
               </a:rPr>
-              <a:t>Usage of platform native views and intermixing them</a:t>
+              <a:t>Usage of platform, native views and intermixing them.</a:t>
             </a:r>
           </a:p>
           <a:p>
@@ -36830,7 +36830,7 @@
                   <a:srgbClr val="242424"/>
                 </a:solidFill>
               </a:rPr>
-              <a:t>How Uno works under the hood</a:t>
+              <a:t>How Uno works under the hood.</a:t>
             </a:r>
           </a:p>
           <a:p>
@@ -36840,7 +36840,7 @@
                   <a:srgbClr val="242424"/>
                 </a:solidFill>
               </a:rPr>
-              <a:t>How to extend Uno and monkey patch Uno’s internals</a:t>
+              <a:t>How to extend Uno and monkey patch Uno’s internals.</a:t>
             </a:r>
           </a:p>
           <a:p>
@@ -37877,6 +37877,12 @@
 </file>
 
 <file path=customXml/item1.xml><?xml version="1.0" encoding="utf-8"?>
+<p:properties xmlns:p="http://schemas.microsoft.com/office/2006/metadata/properties" xmlns:xsi="http://www.w3.org/2001/XMLSchema-instance" xmlns:pc="http://schemas.microsoft.com/office/infopath/2007/PartnerControls">
+  <documentManagement/>
+</p:properties>
+</file>
+
+<file path=customXml/item2.xml><?xml version="1.0" encoding="utf-8"?>
 <ct:contentTypeSchema xmlns:ct="http://schemas.microsoft.com/office/2006/metadata/contentType" xmlns:ma="http://schemas.microsoft.com/office/2006/metadata/properties/metaAttributes" ct:_="" ma:_="" ma:contentTypeName="Document" ma:contentTypeID="0x0101008E7D608EF5922E4F9A1A945C4E256D26" ma:contentTypeVersion="6" ma:contentTypeDescription="Create a new document." ma:contentTypeScope="" ma:versionID="b7aa9d99eb92bbd10cc8009bc24bf7da">
   <xsd:schema xmlns:xsd="http://www.w3.org/2001/XMLSchema" xmlns:xs="http://www.w3.org/2001/XMLSchema" xmlns:p="http://schemas.microsoft.com/office/2006/metadata/properties" xmlns:ns2="2f57147f-97e9-408c-b2d8-f56e86b6192a" targetNamespace="http://schemas.microsoft.com/office/2006/metadata/properties" ma:root="true" ma:fieldsID="60ba840e718fb7c4177c2f31ced983f9" ns2:_="">
     <xsd:import namespace="2f57147f-97e9-408c-b2d8-f56e86b6192a"/>
@@ -38034,7 +38040,7 @@
 </ct:contentTypeSchema>
 </file>
 
-<file path=customXml/item2.xml><?xml version="1.0" encoding="utf-8"?>
+<file path=customXml/item3.xml><?xml version="1.0" encoding="utf-8"?>
 <?mso-contentType ?>
 <FormTemplates xmlns="http://schemas.microsoft.com/sharepoint/v3/contenttype/forms">
   <Display>DocumentLibraryForm</Display>
@@ -38043,13 +38049,23 @@
 </FormTemplates>
 </file>
 
-<file path=customXml/item3.xml><?xml version="1.0" encoding="utf-8"?>
-<p:properties xmlns:p="http://schemas.microsoft.com/office/2006/metadata/properties" xmlns:xsi="http://www.w3.org/2001/XMLSchema-instance" xmlns:pc="http://schemas.microsoft.com/office/infopath/2007/PartnerControls">
-  <documentManagement/>
-</p:properties>
+<file path=customXml/itemProps1.xml><?xml version="1.0" encoding="utf-8"?>
+<ds:datastoreItem xmlns:ds="http://schemas.openxmlformats.org/officeDocument/2006/customXml" ds:itemID="{639DF979-6B92-43A8-A549-C38092918C31}">
+  <ds:schemaRefs>
+    <ds:schemaRef ds:uri="http://schemas.microsoft.com/office/infopath/2007/PartnerControls"/>
+    <ds:schemaRef ds:uri="http://www.w3.org/XML/1998/namespace"/>
+    <ds:schemaRef ds:uri="http://purl.org/dc/terms/"/>
+    <ds:schemaRef ds:uri="http://schemas.openxmlformats.org/package/2006/metadata/core-properties"/>
+    <ds:schemaRef ds:uri="2f57147f-97e9-408c-b2d8-f56e86b6192a"/>
+    <ds:schemaRef ds:uri="http://purl.org/dc/elements/1.1/"/>
+    <ds:schemaRef ds:uri="http://schemas.microsoft.com/office/2006/documentManagement/types"/>
+    <ds:schemaRef ds:uri="http://schemas.microsoft.com/office/2006/metadata/properties"/>
+    <ds:schemaRef ds:uri="http://purl.org/dc/dcmitype/"/>
+  </ds:schemaRefs>
+</ds:datastoreItem>
 </file>
 
-<file path=customXml/itemProps1.xml><?xml version="1.0" encoding="utf-8"?>
+<file path=customXml/itemProps2.xml><?xml version="1.0" encoding="utf-8"?>
 <ds:datastoreItem xmlns:ds="http://schemas.openxmlformats.org/officeDocument/2006/customXml" ds:itemID="{5BA922A0-4343-4661-A556-DB1CB86D3D99}">
   <ds:schemaRefs>
     <ds:schemaRef ds:uri="http://schemas.microsoft.com/office/2006/metadata/contentType"/>
@@ -38067,26 +38083,10 @@
 </ds:datastoreItem>
 </file>
 
-<file path=customXml/itemProps2.xml><?xml version="1.0" encoding="utf-8"?>
+<file path=customXml/itemProps3.xml><?xml version="1.0" encoding="utf-8"?>
 <ds:datastoreItem xmlns:ds="http://schemas.openxmlformats.org/officeDocument/2006/customXml" ds:itemID="{E1527E6B-B12C-4470-B3E9-E3F191525A7E}">
   <ds:schemaRefs>
     <ds:schemaRef ds:uri="http://schemas.microsoft.com/sharepoint/v3/contenttype/forms"/>
   </ds:schemaRefs>
 </ds:datastoreItem>
-</file>
-
-<file path=customXml/itemProps3.xml><?xml version="1.0" encoding="utf-8"?>
-<ds:datastoreItem xmlns:ds="http://schemas.openxmlformats.org/officeDocument/2006/customXml" ds:itemID="{639DF979-6B92-43A8-A549-C38092918C31}">
-  <ds:schemaRefs>
-    <ds:schemaRef ds:uri="http://purl.org/dc/dcmitype/"/>
-    <ds:schemaRef ds:uri="http://schemas.microsoft.com/office/2006/documentManagement/types"/>
-    <ds:schemaRef ds:uri="http://schemas.microsoft.com/office/2006/metadata/properties"/>
-    <ds:schemaRef ds:uri="http://purl.org/dc/terms/"/>
-    <ds:schemaRef ds:uri="http://www.w3.org/XML/1998/namespace"/>
-    <ds:schemaRef ds:uri="http://purl.org/dc/elements/1.1/"/>
-    <ds:schemaRef ds:uri="http://schemas.openxmlformats.org/package/2006/metadata/core-properties"/>
-    <ds:schemaRef ds:uri="http://schemas.microsoft.com/office/infopath/2007/PartnerControls"/>
-    <ds:schemaRef ds:uri="2f57147f-97e9-408c-b2d8-f56e86b6192a"/>
-  </ds:schemaRefs>
-</ds:datastoreItem>
 </file>
</xml_diff>